<commit_message>
Updated videos in module02
</commit_message>
<xml_diff>
--- a/clinical-research-methodology/results/video02-planning.pptx
+++ b/clinical-research-methodology/results/video02-planning.pptx
@@ -1085,7 +1085,15 @@
             </a:r>
             <a:r>
               <a:rPr/>
-              <a:t>Researchthat</a:t>
+              <a:t>Research</a:t>
+            </a:r>
+            <a:r>
+              <a:rPr/>
+              <a:t> </a:t>
+            </a:r>
+            <a:r>
+              <a:rPr/>
+              <a:t>that</a:t>
             </a:r>
             <a:r>
               <a:rPr/>
@@ -36313,7 +36321,7 @@
             </a:r>
             <a:r>
               <a:rPr/>
-              <a:t>labelling</a:t>
+              <a:t>labeling</a:t>
             </a:r>
             <a:r>
               <a:rPr/>
@@ -37323,7 +37331,7 @@
             </a:r>
             <a:r>
               <a:rPr/>
-              <a:t>drg</a:t>
+              <a:t>drug</a:t>
             </a:r>
             <a:r>
               <a:rPr/>
@@ -37340,30 +37348,6 @@
             <a:r>
               <a:rPr/>
               <a:t>process)</a:t>
-            </a:r>
-            <a:r>
-              <a:rPr/>
-              <a:t> </a:t>
-            </a:r>
-            <a:r>
-              <a:rPr/>
-              <a:t>for</a:t>
-            </a:r>
-            <a:r>
-              <a:rPr/>
-              <a:t> </a:t>
-            </a:r>
-            <a:r>
-              <a:rPr/>
-              <a:t>approved</a:t>
-            </a:r>
-            <a:r>
-              <a:rPr/>
-              <a:t> </a:t>
-            </a:r>
-            <a:r>
-              <a:rPr/>
-              <a:t>drugs</a:t>
             </a:r>
             <a:r>
               <a:rPr/>
@@ -40703,6 +40687,308 @@
             </a:pPr>
             <a:r>
               <a:rPr/>
+              <a:t>I’m</a:t>
+            </a:r>
+            <a:r>
+              <a:rPr/>
+              <a:t> </a:t>
+            </a:r>
+            <a:r>
+              <a:rPr/>
+              <a:t>working</a:t>
+            </a:r>
+            <a:r>
+              <a:rPr/>
+              <a:t> </a:t>
+            </a:r>
+            <a:r>
+              <a:rPr/>
+              <a:t>with</a:t>
+            </a:r>
+            <a:r>
+              <a:rPr/>
+              <a:t> </a:t>
+            </a:r>
+            <a:r>
+              <a:rPr/>
+              <a:t>a</a:t>
+            </a:r>
+            <a:r>
+              <a:rPr/>
+              <a:t> </a:t>
+            </a:r>
+            <a:r>
+              <a:rPr/>
+              <a:t>group</a:t>
+            </a:r>
+            <a:r>
+              <a:rPr/>
+              <a:t> </a:t>
+            </a:r>
+            <a:r>
+              <a:rPr/>
+              <a:t>that</a:t>
+            </a:r>
+            <a:r>
+              <a:rPr/>
+              <a:t> </a:t>
+            </a:r>
+            <a:r>
+              <a:rPr/>
+              <a:t>is</a:t>
+            </a:r>
+            <a:r>
+              <a:rPr/>
+              <a:t> </a:t>
+            </a:r>
+            <a:r>
+              <a:rPr/>
+              <a:t>making</a:t>
+            </a:r>
+            <a:r>
+              <a:rPr/>
+              <a:t> </a:t>
+            </a:r>
+            <a:r>
+              <a:rPr/>
+              <a:t>exterior</a:t>
+            </a:r>
+            <a:r>
+              <a:rPr/>
+              <a:t> </a:t>
+            </a:r>
+            <a:r>
+              <a:rPr/>
+              <a:t>evaluations</a:t>
+            </a:r>
+            <a:r>
+              <a:rPr/>
+              <a:t> </a:t>
+            </a:r>
+            <a:r>
+              <a:rPr/>
+              <a:t>of</a:t>
+            </a:r>
+            <a:r>
+              <a:rPr/>
+              <a:t> </a:t>
+            </a:r>
+            <a:r>
+              <a:rPr/>
+              <a:t>housing</a:t>
+            </a:r>
+            <a:r>
+              <a:rPr/>
+              <a:t> </a:t>
+            </a:r>
+            <a:r>
+              <a:rPr/>
+              <a:t>units</a:t>
+            </a:r>
+            <a:r>
+              <a:rPr/>
+              <a:t> </a:t>
+            </a:r>
+            <a:r>
+              <a:rPr/>
+              <a:t>because</a:t>
+            </a:r>
+            <a:r>
+              <a:rPr/>
+              <a:t> </a:t>
+            </a:r>
+            <a:r>
+              <a:rPr/>
+              <a:t>the</a:t>
+            </a:r>
+            <a:r>
+              <a:rPr/>
+              <a:t> </a:t>
+            </a:r>
+            <a:r>
+              <a:rPr/>
+              <a:t>environment</a:t>
+            </a:r>
+            <a:r>
+              <a:rPr/>
+              <a:t> </a:t>
+            </a:r>
+            <a:r>
+              <a:rPr/>
+              <a:t>where</a:t>
+            </a:r>
+            <a:r>
+              <a:rPr/>
+              <a:t> </a:t>
+            </a:r>
+            <a:r>
+              <a:rPr/>
+              <a:t>you</a:t>
+            </a:r>
+            <a:r>
+              <a:rPr/>
+              <a:t> </a:t>
+            </a:r>
+            <a:r>
+              <a:rPr/>
+              <a:t>live</a:t>
+            </a:r>
+            <a:r>
+              <a:rPr/>
+              <a:t> </a:t>
+            </a:r>
+            <a:r>
+              <a:rPr/>
+              <a:t>is</a:t>
+            </a:r>
+            <a:r>
+              <a:rPr/>
+              <a:t> </a:t>
+            </a:r>
+            <a:r>
+              <a:rPr/>
+              <a:t>such</a:t>
+            </a:r>
+            <a:r>
+              <a:rPr/>
+              <a:t> </a:t>
+            </a:r>
+            <a:r>
+              <a:rPr/>
+              <a:t>an</a:t>
+            </a:r>
+            <a:r>
+              <a:rPr/>
+              <a:t> </a:t>
+            </a:r>
+            <a:r>
+              <a:rPr/>
+              <a:t>important</a:t>
+            </a:r>
+            <a:r>
+              <a:rPr/>
+              <a:t> </a:t>
+            </a:r>
+            <a:r>
+              <a:rPr/>
+              <a:t>determinant</a:t>
+            </a:r>
+            <a:r>
+              <a:rPr/>
+              <a:t> </a:t>
+            </a:r>
+            <a:r>
+              <a:rPr/>
+              <a:t>of</a:t>
+            </a:r>
+            <a:r>
+              <a:rPr/>
+              <a:t> </a:t>
+            </a:r>
+            <a:r>
+              <a:rPr/>
+              <a:t>health.</a:t>
+            </a:r>
+            <a:r>
+              <a:rPr/>
+              <a:t> </a:t>
+            </a:r>
+            <a:r>
+              <a:rPr/>
+              <a:t>Houses</a:t>
+            </a:r>
+            <a:r>
+              <a:rPr/>
+              <a:t> </a:t>
+            </a:r>
+            <a:r>
+              <a:rPr/>
+              <a:t>aren’t</a:t>
+            </a:r>
+            <a:r>
+              <a:rPr/>
+              <a:t> </a:t>
+            </a:r>
+            <a:r>
+              <a:rPr/>
+              <a:t>people,</a:t>
+            </a:r>
+            <a:r>
+              <a:rPr/>
+              <a:t> </a:t>
+            </a:r>
+            <a:r>
+              <a:rPr/>
+              <a:t>so</a:t>
+            </a:r>
+            <a:r>
+              <a:rPr/>
+              <a:t> </a:t>
+            </a:r>
+            <a:r>
+              <a:rPr/>
+              <a:t>this</a:t>
+            </a:r>
+            <a:r>
+              <a:rPr/>
+              <a:t> </a:t>
+            </a:r>
+            <a:r>
+              <a:rPr/>
+              <a:t>work</a:t>
+            </a:r>
+            <a:r>
+              <a:rPr/>
+              <a:t> </a:t>
+            </a:r>
+            <a:r>
+              <a:rPr/>
+              <a:t>is</a:t>
+            </a:r>
+            <a:r>
+              <a:rPr/>
+              <a:t> </a:t>
+            </a:r>
+            <a:r>
+              <a:rPr/>
+              <a:t>exempt</a:t>
+            </a:r>
+            <a:r>
+              <a:rPr/>
+              <a:t> </a:t>
+            </a:r>
+            <a:r>
+              <a:rPr/>
+              <a:t>from</a:t>
+            </a:r>
+            <a:r>
+              <a:rPr/>
+              <a:t> </a:t>
+            </a:r>
+            <a:r>
+              <a:rPr/>
+              <a:t>IRB</a:t>
+            </a:r>
+            <a:r>
+              <a:rPr/>
+              <a:t> </a:t>
+            </a:r>
+            <a:r>
+              <a:rPr/>
+              <a:t>review.</a:t>
+            </a:r>
+          </a:p>
+          <a:p>
+            <a:pPr lvl="0" marL="0" indent="0">
+              <a:buNone/>
+            </a:pPr>
+          </a:p>
+          <a:p>
+            <a:pPr lvl="0" marL="0" indent="0">
+              <a:buNone/>
+            </a:pPr>
+            <a:r>
+              <a:rPr/>
               <a:t>Research</a:t>
             </a:r>
             <a:r>
@@ -40904,6 +41190,420 @@
             <a:r>
               <a:rPr/>
               <a:t>information.</a:t>
+            </a:r>
+          </a:p>
+          <a:p>
+            <a:pPr lvl="0" marL="0" indent="0">
+              <a:buNone/>
+            </a:pPr>
+          </a:p>
+          <a:p>
+            <a:pPr lvl="0" marL="0" indent="0">
+              <a:buNone/>
+            </a:pPr>
+            <a:r>
+              <a:rPr/>
+              <a:t>There</a:t>
+            </a:r>
+            <a:r>
+              <a:rPr/>
+              <a:t> </a:t>
+            </a:r>
+            <a:r>
+              <a:rPr/>
+              <a:t>are</a:t>
+            </a:r>
+            <a:r>
+              <a:rPr/>
+              <a:t> </a:t>
+            </a:r>
+            <a:r>
+              <a:rPr/>
+              <a:t>a</a:t>
+            </a:r>
+            <a:r>
+              <a:rPr/>
+              <a:t> </a:t>
+            </a:r>
+            <a:r>
+              <a:rPr/>
+              <a:t>few</a:t>
+            </a:r>
+            <a:r>
+              <a:rPr/>
+              <a:t> </a:t>
+            </a:r>
+            <a:r>
+              <a:rPr/>
+              <a:t>additional</a:t>
+            </a:r>
+            <a:r>
+              <a:rPr/>
+              <a:t> </a:t>
+            </a:r>
+            <a:r>
+              <a:rPr/>
+              <a:t>types</a:t>
+            </a:r>
+            <a:r>
+              <a:rPr/>
+              <a:t> </a:t>
+            </a:r>
+            <a:r>
+              <a:rPr/>
+              <a:t>of</a:t>
+            </a:r>
+            <a:r>
+              <a:rPr/>
+              <a:t> </a:t>
+            </a:r>
+            <a:r>
+              <a:rPr/>
+              <a:t>research</a:t>
+            </a:r>
+            <a:r>
+              <a:rPr/>
+              <a:t> </a:t>
+            </a:r>
+            <a:r>
+              <a:rPr/>
+              <a:t>that</a:t>
+            </a:r>
+            <a:r>
+              <a:rPr/>
+              <a:t> </a:t>
+            </a:r>
+            <a:r>
+              <a:rPr/>
+              <a:t>are</a:t>
+            </a:r>
+            <a:r>
+              <a:rPr/>
+              <a:t> </a:t>
+            </a:r>
+            <a:r>
+              <a:rPr/>
+              <a:t>exempt:</a:t>
+            </a:r>
+            <a:r>
+              <a:rPr/>
+              <a:t> </a:t>
+            </a:r>
+            <a:r>
+              <a:rPr/>
+              <a:t>some</a:t>
+            </a:r>
+            <a:r>
+              <a:rPr/>
+              <a:t> </a:t>
+            </a:r>
+            <a:r>
+              <a:rPr/>
+              <a:t>types</a:t>
+            </a:r>
+            <a:r>
+              <a:rPr/>
+              <a:t> </a:t>
+            </a:r>
+            <a:r>
+              <a:rPr/>
+              <a:t>of</a:t>
+            </a:r>
+            <a:r>
+              <a:rPr/>
+              <a:t> </a:t>
+            </a:r>
+            <a:r>
+              <a:rPr/>
+              <a:t>educational</a:t>
+            </a:r>
+            <a:r>
+              <a:rPr/>
+              <a:t> </a:t>
+            </a:r>
+            <a:r>
+              <a:rPr/>
+              <a:t>evaluations,</a:t>
+            </a:r>
+            <a:r>
+              <a:rPr/>
+              <a:t> </a:t>
+            </a:r>
+            <a:r>
+              <a:rPr/>
+              <a:t>for</a:t>
+            </a:r>
+            <a:r>
+              <a:rPr/>
+              <a:t> </a:t>
+            </a:r>
+            <a:r>
+              <a:rPr/>
+              <a:t>example,</a:t>
+            </a:r>
+            <a:r>
+              <a:rPr/>
+              <a:t> </a:t>
+            </a:r>
+            <a:r>
+              <a:rPr/>
+              <a:t>and</a:t>
+            </a:r>
+            <a:r>
+              <a:rPr/>
+              <a:t> </a:t>
+            </a:r>
+            <a:r>
+              <a:rPr/>
+              <a:t>observations</a:t>
+            </a:r>
+            <a:r>
+              <a:rPr/>
+              <a:t> </a:t>
+            </a:r>
+            <a:r>
+              <a:rPr/>
+              <a:t>made</a:t>
+            </a:r>
+            <a:r>
+              <a:rPr/>
+              <a:t> </a:t>
+            </a:r>
+            <a:r>
+              <a:rPr/>
+              <a:t>in</a:t>
+            </a:r>
+            <a:r>
+              <a:rPr/>
+              <a:t> </a:t>
+            </a:r>
+            <a:r>
+              <a:rPr/>
+              <a:t>a</a:t>
+            </a:r>
+            <a:r>
+              <a:rPr/>
+              <a:t> </a:t>
+            </a:r>
+            <a:r>
+              <a:rPr/>
+              <a:t>public</a:t>
+            </a:r>
+            <a:r>
+              <a:rPr/>
+              <a:t> </a:t>
+            </a:r>
+            <a:r>
+              <a:rPr/>
+              <a:t>setting.</a:t>
+            </a:r>
+            <a:r>
+              <a:rPr/>
+              <a:t> </a:t>
+            </a:r>
+            <a:r>
+              <a:rPr/>
+              <a:t>These</a:t>
+            </a:r>
+            <a:r>
+              <a:rPr/>
+              <a:t> </a:t>
+            </a:r>
+            <a:r>
+              <a:rPr/>
+              <a:t>are</a:t>
+            </a:r>
+            <a:r>
+              <a:rPr/>
+              <a:t> </a:t>
+            </a:r>
+            <a:r>
+              <a:rPr/>
+              <a:t>not</a:t>
+            </a:r>
+            <a:r>
+              <a:rPr/>
+              <a:t> </a:t>
+            </a:r>
+            <a:r>
+              <a:rPr/>
+              <a:t>as</a:t>
+            </a:r>
+            <a:r>
+              <a:rPr/>
+              <a:t> </a:t>
+            </a:r>
+            <a:r>
+              <a:rPr/>
+              <a:t>common–the</a:t>
+            </a:r>
+            <a:r>
+              <a:rPr/>
+              <a:t> </a:t>
+            </a:r>
+            <a:r>
+              <a:rPr/>
+              <a:t>big</a:t>
+            </a:r>
+            <a:r>
+              <a:rPr/>
+              <a:t> </a:t>
+            </a:r>
+            <a:r>
+              <a:rPr/>
+              <a:t>two</a:t>
+            </a:r>
+            <a:r>
+              <a:rPr/>
+              <a:t> </a:t>
+            </a:r>
+            <a:r>
+              <a:rPr/>
+              <a:t>reasons</a:t>
+            </a:r>
+            <a:r>
+              <a:rPr/>
+              <a:t> </a:t>
+            </a:r>
+            <a:r>
+              <a:rPr/>
+              <a:t>why</a:t>
+            </a:r>
+            <a:r>
+              <a:rPr/>
+              <a:t> </a:t>
+            </a:r>
+            <a:r>
+              <a:rPr/>
+              <a:t>your</a:t>
+            </a:r>
+            <a:r>
+              <a:rPr/>
+              <a:t> </a:t>
+            </a:r>
+            <a:r>
+              <a:rPr/>
+              <a:t>study</a:t>
+            </a:r>
+            <a:r>
+              <a:rPr/>
+              <a:t> </a:t>
+            </a:r>
+            <a:r>
+              <a:rPr/>
+              <a:t>is</a:t>
+            </a:r>
+            <a:r>
+              <a:rPr/>
+              <a:t> </a:t>
+            </a:r>
+            <a:r>
+              <a:rPr/>
+              <a:t>exempt</a:t>
+            </a:r>
+            <a:r>
+              <a:rPr/>
+              <a:t> </a:t>
+            </a:r>
+            <a:r>
+              <a:rPr/>
+              <a:t>are</a:t>
+            </a:r>
+            <a:r>
+              <a:rPr/>
+              <a:t> </a:t>
+            </a:r>
+            <a:r>
+              <a:rPr/>
+              <a:t>because</a:t>
+            </a:r>
+            <a:r>
+              <a:rPr/>
+              <a:t> </a:t>
+            </a:r>
+            <a:r>
+              <a:rPr/>
+              <a:t>it</a:t>
+            </a:r>
+            <a:r>
+              <a:rPr/>
+              <a:t> </a:t>
+            </a:r>
+            <a:r>
+              <a:rPr/>
+              <a:t>is</a:t>
+            </a:r>
+            <a:r>
+              <a:rPr/>
+              <a:t> </a:t>
+            </a:r>
+            <a:r>
+              <a:rPr/>
+              <a:t>not</a:t>
+            </a:r>
+            <a:r>
+              <a:rPr/>
+              <a:t> </a:t>
+            </a:r>
+            <a:r>
+              <a:rPr/>
+              <a:t>research</a:t>
+            </a:r>
+            <a:r>
+              <a:rPr/>
+              <a:t> </a:t>
+            </a:r>
+            <a:r>
+              <a:rPr/>
+              <a:t>or</a:t>
+            </a:r>
+            <a:r>
+              <a:rPr/>
+              <a:t> </a:t>
+            </a:r>
+            <a:r>
+              <a:rPr/>
+              <a:t>it</a:t>
+            </a:r>
+            <a:r>
+              <a:rPr/>
+              <a:t> </a:t>
+            </a:r>
+            <a:r>
+              <a:rPr/>
+              <a:t>does</a:t>
+            </a:r>
+            <a:r>
+              <a:rPr/>
+              <a:t> </a:t>
+            </a:r>
+            <a:r>
+              <a:rPr/>
+              <a:t>not</a:t>
+            </a:r>
+            <a:r>
+              <a:rPr/>
+              <a:t> </a:t>
+            </a:r>
+            <a:r>
+              <a:rPr/>
+              <a:t>involve</a:t>
+            </a:r>
+            <a:r>
+              <a:rPr/>
+              <a:t> </a:t>
+            </a:r>
+            <a:r>
+              <a:rPr/>
+              <a:t>human</a:t>
+            </a:r>
+            <a:r>
+              <a:rPr/>
+              <a:t> </a:t>
+            </a:r>
+            <a:r>
+              <a:rPr/>
+              <a:t>subjects.</a:t>
             </a:r>
           </a:p>
           <a:p>
@@ -55545,7 +56245,7 @@
             </a:r>
             <a:r>
               <a:rPr/>
-              <a:t>hyothesis,</a:t>
+              <a:t>hypothesis,</a:t>
             </a:r>
             <a:r>
               <a:rPr/>
@@ -57711,47 +58411,7 @@
             </a:r>
             <a:r>
               <a:rPr/>
-              <a:t>improvement</a:t>
-            </a:r>
-            <a:r>
-              <a:rPr/>
-              <a:t> </a:t>
-            </a:r>
-            <a:r>
-              <a:rPr/>
-              <a:t>(ethical</a:t>
-            </a:r>
-            <a:r>
-              <a:rPr/>
-              <a:t> </a:t>
-            </a:r>
-            <a:r>
-              <a:rPr/>
-              <a:t>conduct,</a:t>
-            </a:r>
-            <a:r>
-              <a:rPr/>
-              <a:t> </a:t>
-            </a:r>
-            <a:r>
-              <a:rPr/>
-              <a:t>I</a:t>
-            </a:r>
-            <a:r>
-              <a:rPr/>
-              <a:t> </a:t>
-            </a:r>
-            <a:r>
-              <a:rPr/>
-              <a:t>should</a:t>
-            </a:r>
-            <a:r>
-              <a:rPr/>
-              <a:t> </a:t>
-            </a:r>
-            <a:r>
-              <a:rPr/>
-              <a:t>say)</a:t>
+              <a:t>conduct</a:t>
             </a:r>
             <a:r>
               <a:rPr/>
@@ -57967,7 +58627,7 @@
             </a:r>
             <a:r>
               <a:rPr/>
-              <a:t>yours</a:t>
+              <a:t>your</a:t>
             </a:r>
             <a:r>
               <a:rPr/>
@@ -62149,7 +62809,15 @@
             </a:pPr>
             <a:r>
               <a:rPr/>
-              <a:t>Steps</a:t>
+              <a:t>Step</a:t>
+            </a:r>
+            <a:r>
+              <a:rPr/>
+              <a:t> </a:t>
+            </a:r>
+            <a:r>
+              <a:rPr/>
+              <a:t>7</a:t>
             </a:r>
             <a:r>
               <a:rPr/>
@@ -62204,7 +62872,7 @@
             <a:pPr lvl="1"/>
             <a:r>
               <a:rPr/>
-              <a:t>Step 7: Collect your data</a:t>
+              <a:t>Collect your data</a:t>
             </a:r>
           </a:p>
           <a:p>
@@ -62265,7 +62933,15 @@
             </a:pPr>
             <a:r>
               <a:rPr/>
-              <a:t>Steps</a:t>
+              <a:t>Step</a:t>
+            </a:r>
+            <a:r>
+              <a:rPr/>
+              <a:t> </a:t>
+            </a:r>
+            <a:r>
+              <a:rPr/>
+              <a:t>8</a:t>
             </a:r>
             <a:r>
               <a:rPr/>
@@ -62320,7 +62996,7 @@
             <a:pPr lvl="1"/>
             <a:r>
               <a:rPr/>
-              <a:t>Step 8: Analyze your data</a:t>
+              <a:t>Analyze your data</a:t>
             </a:r>
           </a:p>
           <a:p>
@@ -62381,7 +63057,15 @@
             </a:pPr>
             <a:r>
               <a:rPr/>
-              <a:t>Steps</a:t>
+              <a:t>Step</a:t>
+            </a:r>
+            <a:r>
+              <a:rPr/>
+              <a:t> </a:t>
+            </a:r>
+            <a:r>
+              <a:rPr/>
+              <a:t>9</a:t>
             </a:r>
             <a:r>
               <a:rPr/>
@@ -62436,7 +63120,7 @@
             <a:pPr lvl="1"/>
             <a:r>
               <a:rPr/>
-              <a:t>Step 9: Interpret your data</a:t>
+              <a:t>Interpret your data</a:t>
             </a:r>
           </a:p>
           <a:p>
@@ -62497,7 +63181,15 @@
             </a:pPr>
             <a:r>
               <a:rPr/>
-              <a:t>Steps</a:t>
+              <a:t>Step</a:t>
+            </a:r>
+            <a:r>
+              <a:rPr/>
+              <a:t> </a:t>
+            </a:r>
+            <a:r>
+              <a:rPr/>
+              <a:t>10</a:t>
             </a:r>
             <a:r>
               <a:rPr/>
@@ -62552,7 +63244,7 @@
             <a:pPr lvl="1"/>
             <a:r>
               <a:rPr/>
-              <a:t>Step 10: Communicate your findings</a:t>
+              <a:t>Communicate your findings</a:t>
             </a:r>
           </a:p>
           <a:p>
@@ -62738,30 +63430,6 @@
             <a:pPr lvl="0" marL="0" indent="0">
               <a:buNone/>
             </a:pPr>
-            <a:r>
-              <a:rPr/>
-              <a:t>Step</a:t>
-            </a:r>
-            <a:r>
-              <a:rPr/>
-              <a:t> </a:t>
-            </a:r>
-            <a:r>
-              <a:rPr/>
-              <a:t>1</a:t>
-            </a:r>
-            <a:r>
-              <a:rPr/>
-              <a:t> </a:t>
-            </a:r>
-            <a:r>
-              <a:rPr/>
-              <a:t>-</a:t>
-            </a:r>
-            <a:r>
-              <a:rPr/>
-              <a:t> </a:t>
-            </a:r>
             <a:r>
               <a:rPr/>
               <a:t>Identify</a:t>
@@ -64431,13 +65099,6 @@
             <a:pPr lvl="1"/>
             <a:r>
               <a:rPr/>
-              <a:t>Federal Food, Drug, and Cosmetic Act (1938)</a:t>
-            </a:r>
-          </a:p>
-          <a:p>
-            <a:pPr lvl="1"/>
-            <a:r>
-              <a:rPr/>
               <a:t>Nuremberg code (1947)</a:t>
             </a:r>
           </a:p>
@@ -64748,6 +65409,13 @@
             <a:r>
               <a:rPr/>
               <a:t>use of private information.</a:t>
+            </a:r>
+          </a:p>
+          <a:p>
+            <a:pPr lvl="1"/>
+            <a:r>
+              <a:rPr/>
+              <a:t>Other minor exemption categories</a:t>
             </a:r>
           </a:p>
         </p:txBody>
@@ -65925,7 +66593,15 @@
             </a:pPr>
             <a:r>
               <a:rPr/>
-              <a:t>Steps</a:t>
+              <a:t>Step</a:t>
+            </a:r>
+            <a:r>
+              <a:rPr/>
+              <a:t> </a:t>
+            </a:r>
+            <a:r>
+              <a:rPr/>
+              <a:t>1</a:t>
             </a:r>
             <a:r>
               <a:rPr/>
@@ -65980,7 +66656,7 @@
             <a:pPr lvl="1"/>
             <a:r>
               <a:rPr/>
-              <a:t>Step 1: Identify a research problem</a:t>
+              <a:t>Identify a research problem</a:t>
             </a:r>
           </a:p>
           <a:p>
@@ -66041,7 +66717,15 @@
             </a:pPr>
             <a:r>
               <a:rPr/>
-              <a:t>Steps</a:t>
+              <a:t>Step</a:t>
+            </a:r>
+            <a:r>
+              <a:rPr/>
+              <a:t> </a:t>
+            </a:r>
+            <a:r>
+              <a:rPr/>
+              <a:t>2</a:t>
             </a:r>
             <a:r>
               <a:rPr/>
@@ -66096,7 +66780,7 @@
             <a:pPr lvl="1"/>
             <a:r>
               <a:rPr/>
-              <a:t>Step 2: Conduct your literature review</a:t>
+              <a:t>Conduct your literature review</a:t>
             </a:r>
           </a:p>
           <a:p>
@@ -66164,7 +66848,15 @@
             </a:pPr>
             <a:r>
               <a:rPr/>
-              <a:t>Steps</a:t>
+              <a:t>Step</a:t>
+            </a:r>
+            <a:r>
+              <a:rPr/>
+              <a:t> </a:t>
+            </a:r>
+            <a:r>
+              <a:rPr/>
+              <a:t>3</a:t>
             </a:r>
             <a:r>
               <a:rPr/>
@@ -66219,7 +66911,7 @@
             <a:pPr lvl="1"/>
             <a:r>
               <a:rPr/>
-              <a:t>Step 3: Specify your research hypothesis</a:t>
+              <a:t>Specify your research hypothesis</a:t>
             </a:r>
           </a:p>
           <a:p>
@@ -66294,7 +66986,15 @@
             </a:pPr>
             <a:r>
               <a:rPr/>
-              <a:t>Steps</a:t>
+              <a:t>Step</a:t>
+            </a:r>
+            <a:r>
+              <a:rPr/>
+              <a:t> </a:t>
+            </a:r>
+            <a:r>
+              <a:rPr/>
+              <a:t>4</a:t>
             </a:r>
             <a:r>
               <a:rPr/>
@@ -66349,7 +67049,7 @@
             <a:pPr lvl="1"/>
             <a:r>
               <a:rPr/>
-              <a:t>Step 4: Select your research approach</a:t>
+              <a:t>Select your research approach</a:t>
             </a:r>
           </a:p>
           <a:p>
@@ -66417,7 +67117,7 @@
             </a:pPr>
             <a:r>
               <a:rPr/>
-              <a:t>Steps</a:t>
+              <a:t>Step5</a:t>
             </a:r>
             <a:r>
               <a:rPr/>
@@ -66472,7 +67172,7 @@
             <a:pPr lvl="1"/>
             <a:r>
               <a:rPr/>
-              <a:t>Step 5: Create a plan for your research</a:t>
+              <a:t>Create a plan for your research</a:t>
             </a:r>
           </a:p>
           <a:p>
@@ -66533,7 +67233,15 @@
             </a:pPr>
             <a:r>
               <a:rPr/>
-              <a:t>Steps</a:t>
+              <a:t>Step</a:t>
+            </a:r>
+            <a:r>
+              <a:rPr/>
+              <a:t> </a:t>
+            </a:r>
+            <a:r>
+              <a:rPr/>
+              <a:t>6</a:t>
             </a:r>
             <a:r>
               <a:rPr/>
@@ -66588,7 +67296,7 @@
             <a:pPr lvl="1"/>
             <a:r>
               <a:rPr/>
-              <a:t>Step 6: Obtain ethical approval</a:t>
+              <a:t>Obtain ethical approval</a:t>
             </a:r>
           </a:p>
           <a:p>

</xml_diff>